<commit_message>
updated english tutorial topics
</commit_message>
<xml_diff>
--- a/tutorials/developers/tutorials-developers-english.pptx
+++ b/tutorials/developers/tutorials-developers-english.pptx
@@ -3866,15 +3866,7 @@
                   <a:schemeClr val="tx1"/>
                 </a:solidFill>
               </a:rPr>
-              <a:t>WITH SOCNET </a:t>
-            </a:r>
-            <a:r>
-              <a:rPr lang="en-US" b="1" dirty="0" smtClean="0">
-                <a:solidFill>
-                  <a:schemeClr val="tx1"/>
-                </a:solidFill>
-              </a:rPr>
-              <a:t>SDK</a:t>
+              <a:t>WITH SOCNET SDK</a:t>
             </a:r>
             <a:br>
               <a:rPr lang="en-US" b="1" dirty="0" smtClean="0">
@@ -4632,15 +4624,7 @@
                     <a:schemeClr val="bg1"/>
                   </a:solidFill>
                 </a:rPr>
-                <a:t>3 </a:t>
-              </a:r>
-              <a:r>
-                <a:rPr lang="en-US" sz="2400" dirty="0" smtClean="0">
-                  <a:solidFill>
-                    <a:schemeClr val="bg1"/>
-                  </a:solidFill>
-                </a:rPr>
-                <a:t>Main Files</a:t>
+                <a:t>3 Main Files</a:t>
               </a:r>
               <a:endParaRPr lang="en-US" sz="2400" dirty="0">
                 <a:solidFill>
@@ -5341,11 +5325,7 @@
             </a:pPr>
             <a:r>
               <a:rPr lang="en-US" dirty="0" smtClean="0"/>
-              <a:t>Consists of user </a:t>
-            </a:r>
-            <a:r>
-              <a:rPr lang="en-US" dirty="0" smtClean="0"/>
-              <a:t>login.</a:t>
+              <a:t>Consists of user login.</a:t>
             </a:r>
           </a:p>
           <a:p>
@@ -5358,7 +5338,6 @@
               <a:rPr lang="en-US" dirty="0" smtClean="0"/>
               <a:t>The content format is fixed.</a:t>
             </a:r>
-            <a:endParaRPr lang="en-US" dirty="0" smtClean="0"/>
           </a:p>
           <a:p>
             <a:pPr lvl="1">
@@ -5384,11 +5363,7 @@
             </a:r>
             <a:r>
               <a:rPr lang="en-US" dirty="0" smtClean="0"/>
-              <a:t> </a:t>
-            </a:r>
-            <a:r>
-              <a:rPr lang="en-US" dirty="0" smtClean="0"/>
-              <a:t>and encrypted </a:t>
+              <a:t> and encrypted </a:t>
             </a:r>
             <a:r>
               <a:rPr lang="en-US" b="1" dirty="0" smtClean="0"/>
@@ -5398,7 +5373,6 @@
               <a:rPr lang="en-US" dirty="0" smtClean="0"/>
               <a:t>.</a:t>
             </a:r>
-            <a:endParaRPr lang="en-US" dirty="0" smtClean="0"/>
           </a:p>
         </p:txBody>
       </p:sp>
@@ -5535,11 +5509,6 @@
                 </a:rPr>
                 <a:t>3 Main Files</a:t>
               </a:r>
-              <a:endParaRPr lang="en-US" sz="2400" dirty="0">
-                <a:solidFill>
-                  <a:schemeClr val="bg1"/>
-                </a:solidFill>
-              </a:endParaRPr>
             </a:p>
           </p:txBody>
         </p:sp>
@@ -5784,7 +5753,6 @@
               <a:rPr lang="en-US" dirty="0" smtClean="0"/>
               <a:t>Example:</a:t>
             </a:r>
-            <a:endParaRPr lang="en-US" dirty="0" smtClean="0"/>
           </a:p>
           <a:p>
             <a:pPr lvl="2">
@@ -5957,11 +5925,6 @@
                 </a:rPr>
                 <a:t>3 Main Files</a:t>
               </a:r>
-              <a:endParaRPr lang="en-US" sz="2400" dirty="0">
-                <a:solidFill>
-                  <a:schemeClr val="bg1"/>
-                </a:solidFill>
-              </a:endParaRPr>
             </a:p>
           </p:txBody>
         </p:sp>
@@ -6177,17 +6140,8 @@
             </a:pPr>
             <a:r>
               <a:rPr lang="en-US" dirty="0" smtClean="0"/>
-              <a:t>A file containing text to be published. Each post are </a:t>
-            </a:r>
-            <a:r>
-              <a:rPr lang="en-US" dirty="0" smtClean="0"/>
-              <a:t>separated by new line</a:t>
-            </a:r>
-            <a:r>
-              <a:rPr lang="en-US" dirty="0" smtClean="0"/>
-              <a:t>.</a:t>
-            </a:r>
-            <a:endParaRPr lang="en-US" dirty="0" smtClean="0"/>
+              <a:t>A file containing text to be published. Each post are separated by new line.</a:t>
+            </a:r>
           </a:p>
           <a:p>
             <a:pPr lvl="1">
@@ -6332,11 +6286,6 @@
                 </a:rPr>
                 <a:t>3 Main Files</a:t>
               </a:r>
-              <a:endParaRPr lang="en-US" sz="2400" dirty="0">
-                <a:solidFill>
-                  <a:schemeClr val="bg1"/>
-                </a:solidFill>
-              </a:endParaRPr>
             </a:p>
           </p:txBody>
         </p:sp>
@@ -6565,7 +6514,6 @@
               <a:rPr lang="en-US" dirty="0" smtClean="0"/>
               <a:t>Example:</a:t>
             </a:r>
-            <a:endParaRPr lang="en-US" dirty="0" smtClean="0"/>
           </a:p>
           <a:p>
             <a:pPr lvl="2">
@@ -6577,7 +6525,6 @@
               <a:rPr lang="en-US" dirty="0" smtClean="0"/>
               <a:t>Cool man!</a:t>
             </a:r>
-            <a:endParaRPr lang="en-US" dirty="0" smtClean="0"/>
           </a:p>
           <a:p>
             <a:pPr lvl="2">
@@ -6587,17 +6534,8 @@
             </a:pPr>
             <a:r>
               <a:rPr lang="en-US" dirty="0" smtClean="0"/>
-              <a:t>Now we’re joining © </a:t>
-            </a:r>
-            <a:r>
-              <a:rPr lang="en-US" dirty="0" smtClean="0"/>
-              <a:t>YourBrand.com </a:t>
-            </a:r>
-            <a:r>
-              <a:rPr lang="en-US" dirty="0" smtClean="0"/>
-              <a:t>since 2013!</a:t>
-            </a:r>
-            <a:endParaRPr lang="en-US" dirty="0" smtClean="0"/>
+              <a:t>Now we’re joining © YourBrand.com since 2013!</a:t>
+            </a:r>
           </a:p>
           <a:p>
             <a:pPr lvl="2">
@@ -6742,11 +6680,6 @@
                 </a:rPr>
                 <a:t>3 Main Files</a:t>
               </a:r>
-              <a:endParaRPr lang="en-US" sz="2400" dirty="0">
-                <a:solidFill>
-                  <a:schemeClr val="bg1"/>
-                </a:solidFill>
-              </a:endParaRPr>
             </a:p>
           </p:txBody>
         </p:sp>
@@ -6959,23 +6892,7 @@
             </a:pPr>
             <a:r>
               <a:rPr lang="en-US" dirty="0" smtClean="0"/>
-              <a:t>*.</a:t>
-            </a:r>
-            <a:r>
-              <a:rPr lang="en-US" dirty="0" smtClean="0"/>
-              <a:t>exe </a:t>
-            </a:r>
-            <a:r>
-              <a:rPr lang="en-US" dirty="0" smtClean="0"/>
-              <a:t>File used in Windows </a:t>
-            </a:r>
-            <a:r>
-              <a:rPr lang="en-US" dirty="0" smtClean="0"/>
-              <a:t>OS, </a:t>
-            </a:r>
-            <a:r>
-              <a:rPr lang="en-US" dirty="0" smtClean="0"/>
-              <a:t>and *.</a:t>
+              <a:t>*.exe File used in Windows OS, and *.</a:t>
             </a:r>
             <a:r>
               <a:rPr lang="en-US" dirty="0" err="1" smtClean="0"/>
@@ -6983,21 +6900,8 @@
             </a:r>
             <a:r>
               <a:rPr lang="en-US" dirty="0" smtClean="0"/>
-              <a:t> </a:t>
-            </a:r>
-            <a:r>
-              <a:rPr lang="en-US" dirty="0" smtClean="0"/>
-              <a:t>file used in Linux</a:t>
-            </a:r>
-            <a:r>
-              <a:rPr lang="en-US" dirty="0" smtClean="0"/>
-              <a:t>, </a:t>
-            </a:r>
-            <a:r>
-              <a:rPr lang="en-US" dirty="0" smtClean="0"/>
-              <a:t>etc.</a:t>
-            </a:r>
-            <a:endParaRPr lang="en-US" dirty="0" smtClean="0"/>
+              <a:t> file used in Linux, etc.</a:t>
+            </a:r>
           </a:p>
           <a:p>
             <a:pPr lvl="1">
@@ -7015,11 +6919,7 @@
             </a:r>
             <a:r>
               <a:rPr lang="en-US" dirty="0" smtClean="0"/>
-              <a:t>version of 2.36</a:t>
-            </a:r>
-            <a:r>
-              <a:rPr lang="en-US" dirty="0" smtClean="0"/>
-              <a:t>.</a:t>
+              <a:t>version of 2.36.</a:t>
             </a:r>
           </a:p>
           <a:p>
@@ -7038,23 +6938,11 @@
             </a:r>
             <a:r>
               <a:rPr lang="en-US" b="1" dirty="0" smtClean="0"/>
-              <a:t> </a:t>
-            </a:r>
-            <a:r>
-              <a:rPr lang="en-US" b="1" dirty="0" smtClean="0"/>
-              <a:t>(java library)</a:t>
+              <a:t> (java library)</a:t>
             </a:r>
             <a:r>
               <a:rPr lang="en-US" dirty="0" smtClean="0"/>
-              <a:t> </a:t>
-            </a:r>
-            <a:r>
-              <a:rPr lang="en-US" dirty="0" smtClean="0"/>
-              <a:t>version of 6.22</a:t>
-            </a:r>
-            <a:r>
-              <a:rPr lang="en-US" dirty="0" smtClean="0"/>
-              <a:t>.</a:t>
+              <a:t> version of 6.22.</a:t>
             </a:r>
           </a:p>
           <a:p>
@@ -7206,11 +7094,6 @@
                 </a:rPr>
                 <a:t>3 Main Files</a:t>
               </a:r>
-              <a:endParaRPr lang="en-US" sz="2400" dirty="0">
-                <a:solidFill>
-                  <a:schemeClr val="bg1"/>
-                </a:solidFill>
-              </a:endParaRPr>
             </a:p>
           </p:txBody>
         </p:sp>
@@ -7542,11 +7425,7 @@
             </a:r>
             <a:r>
               <a:rPr lang="en-US" b="1" dirty="0" smtClean="0"/>
-              <a:t> </a:t>
-            </a:r>
-            <a:r>
-              <a:rPr lang="en-US" b="1" dirty="0" smtClean="0"/>
-              <a:t>SDK </a:t>
+              <a:t> SDK </a:t>
             </a:r>
             <a:r>
               <a:rPr lang="en-US" dirty="0" smtClean="0"/>
@@ -7554,17 +7433,12 @@
             </a:r>
             <a:r>
               <a:rPr lang="en-US" b="1" dirty="0" smtClean="0"/>
-              <a:t>Java </a:t>
-            </a:r>
-            <a:r>
-              <a:rPr lang="en-US" b="1" dirty="0" smtClean="0"/>
-              <a:t>Developers </a:t>
+              <a:t>Java Developers </a:t>
             </a:r>
             <a:r>
               <a:rPr lang="en-US" dirty="0" smtClean="0"/>
               <a:t>you have to understand about :</a:t>
             </a:r>
-            <a:endParaRPr lang="en-US" dirty="0" smtClean="0"/>
           </a:p>
           <a:p>
             <a:pPr marL="768096" lvl="2" indent="0">
@@ -7959,15 +7833,7 @@
             </a:r>
             <a:r>
               <a:rPr lang="en-US" b="1" dirty="0" smtClean="0"/>
-              <a:t> </a:t>
-            </a:r>
-            <a:r>
-              <a:rPr lang="en-US" b="1" dirty="0" smtClean="0"/>
-              <a:t>SDK </a:t>
-            </a:r>
-            <a:r>
-              <a:rPr lang="en-US" b="1" dirty="0" smtClean="0"/>
-              <a:t>*.</a:t>
+              <a:t> SDK *.</a:t>
             </a:r>
             <a:r>
               <a:rPr lang="en-US" b="1" dirty="0"/>
@@ -7993,7 +7859,6 @@
               <a:rPr lang="en-US" dirty="0" smtClean="0"/>
               <a:t>.</a:t>
             </a:r>
-            <a:endParaRPr lang="en-US" dirty="0" smtClean="0"/>
           </a:p>
         </p:txBody>
       </p:sp>
@@ -8130,11 +7995,6 @@
                 </a:rPr>
                 <a:t>Software Dev. Requirements</a:t>
               </a:r>
-              <a:endParaRPr lang="en-US" sz="2400" dirty="0">
-                <a:solidFill>
-                  <a:schemeClr val="bg1"/>
-                </a:solidFill>
-              </a:endParaRPr>
             </a:p>
           </p:txBody>
         </p:sp>
@@ -8399,11 +8259,7 @@
           <a:p>
             <a:r>
               <a:rPr lang="en-US" dirty="0" smtClean="0"/>
-              <a:t>2 </a:t>
-            </a:r>
-            <a:r>
-              <a:rPr lang="en-US" dirty="0" smtClean="0"/>
-              <a:t>Type of </a:t>
+              <a:t>2 Type of </a:t>
             </a:r>
             <a:r>
               <a:rPr lang="en-US" dirty="0" err="1" smtClean="0"/>
@@ -8413,7 +8269,6 @@
               <a:rPr lang="en-US" dirty="0" smtClean="0"/>
               <a:t> SDK User</a:t>
             </a:r>
-            <a:endParaRPr lang="en-US" dirty="0" smtClean="0"/>
           </a:p>
           <a:p>
             <a:r>
@@ -8428,16 +8283,11 @@
               <a:rPr lang="en-US" dirty="0" smtClean="0"/>
               <a:t> SDK work?</a:t>
             </a:r>
-            <a:endParaRPr lang="en-US" dirty="0" smtClean="0"/>
           </a:p>
           <a:p>
             <a:r>
               <a:rPr lang="en-US" dirty="0" smtClean="0"/>
-              <a:t>3 </a:t>
-            </a:r>
-            <a:r>
-              <a:rPr lang="en-US" dirty="0" smtClean="0"/>
-              <a:t>Main Files</a:t>
+              <a:t>3 Main Files</a:t>
             </a:r>
           </a:p>
           <a:p>
@@ -8445,7 +8295,6 @@
               <a:rPr lang="en-US" dirty="0" smtClean="0"/>
               <a:t>Software Dev. Requirements</a:t>
             </a:r>
-            <a:endParaRPr lang="en-US" dirty="0" smtClean="0"/>
           </a:p>
           <a:p>
             <a:r>
@@ -8458,7 +8307,6 @@
               <a:rPr lang="en-US" dirty="0" smtClean="0"/>
               <a:t>Challenging Simulation</a:t>
             </a:r>
-            <a:endParaRPr lang="en-US" dirty="0" smtClean="0"/>
           </a:p>
         </p:txBody>
       </p:sp>
@@ -8910,7 +8758,6 @@
               <a:rPr lang="en-US" dirty="0" smtClean="0"/>
               <a:t>Let’s try to do:</a:t>
             </a:r>
-            <a:endParaRPr lang="en-US" dirty="0" smtClean="0"/>
           </a:p>
           <a:p>
             <a:pPr marL="1225296" lvl="2" indent="-457200">
@@ -8918,11 +8765,7 @@
             </a:pPr>
             <a:r>
               <a:rPr lang="en-US" dirty="0" smtClean="0"/>
-              <a:t>Logging into Facebook</a:t>
-            </a:r>
-            <a:r>
-              <a:rPr lang="en-US" dirty="0" smtClean="0"/>
-              <a:t>, </a:t>
+              <a:t>Logging into Facebook, </a:t>
             </a:r>
           </a:p>
           <a:p>
@@ -8931,15 +8774,7 @@
             </a:pPr>
             <a:r>
               <a:rPr lang="en-US" dirty="0" smtClean="0"/>
-              <a:t>Post a </a:t>
-            </a:r>
-            <a:r>
-              <a:rPr lang="en-US" dirty="0" smtClean="0"/>
-              <a:t>status </a:t>
-            </a:r>
-            <a:r>
-              <a:rPr lang="en-US" dirty="0" smtClean="0"/>
-              <a:t>1x.</a:t>
+              <a:t>Post a status 1x.</a:t>
             </a:r>
           </a:p>
           <a:p>
@@ -8950,7 +8785,6 @@
               <a:rPr lang="en-US" dirty="0" smtClean="0"/>
               <a:t>Close </a:t>
             </a:r>
-            <a:endParaRPr lang="en-US" dirty="0" smtClean="0"/>
           </a:p>
         </p:txBody>
       </p:sp>
@@ -9301,7 +9135,6 @@
               <a:rPr lang="en-US" sz="4400" b="1" dirty="0" smtClean="0"/>
               <a:t>5 lines of Code!</a:t>
             </a:r>
-            <a:endParaRPr lang="en-US" sz="4400" b="1" dirty="0" smtClean="0"/>
           </a:p>
           <a:p>
             <a:pPr marL="768096" lvl="2" indent="0">
@@ -9362,21 +9195,8 @@
                   <a:srgbClr val="FF0000"/>
                 </a:solidFill>
               </a:rPr>
-              <a:t>myUser.addPost</a:t>
-            </a:r>
-            <a:r>
-              <a:rPr lang="en-US" sz="1800" i="1" noProof="1" smtClean="0">
-                <a:solidFill>
-                  <a:srgbClr val="FF0000"/>
-                </a:solidFill>
-              </a:rPr>
-              <a:t>(“try SocNetSDK now!”);</a:t>
-            </a:r>
-            <a:endParaRPr lang="en-US" sz="1800" i="1" noProof="1" smtClean="0">
-              <a:solidFill>
-                <a:srgbClr val="FF0000"/>
-              </a:solidFill>
-            </a:endParaRPr>
+              <a:t>myUser.addPost(“try SocNetSDK now!”);</a:t>
+            </a:r>
           </a:p>
           <a:p>
             <a:pPr marL="0" lvl="2" indent="0">
@@ -9551,11 +9371,6 @@
                 </a:rPr>
                 <a:t>Basic Simulation</a:t>
               </a:r>
-              <a:endParaRPr lang="en-US" sz="2400" dirty="0">
-                <a:solidFill>
-                  <a:schemeClr val="bg1"/>
-                </a:solidFill>
-              </a:endParaRPr>
             </a:p>
           </p:txBody>
         </p:sp>
@@ -9873,15 +9688,7 @@
                   <a:srgbClr val="FF0000"/>
                 </a:solidFill>
               </a:rPr>
-              <a:t>myBot.addUser(myUser</a:t>
-            </a:r>
-            <a:r>
-              <a:rPr lang="en-US" sz="1800" i="1" noProof="1" smtClean="0">
-                <a:solidFill>
-                  <a:srgbClr val="FF0000"/>
-                </a:solidFill>
-              </a:rPr>
-              <a:t>);</a:t>
+              <a:t>myBot.addUser(myUser);</a:t>
             </a:r>
           </a:p>
           <a:p>
@@ -10044,11 +9851,6 @@
                 </a:rPr>
                 <a:t>Basic Simulation</a:t>
               </a:r>
-              <a:endParaRPr lang="en-US" sz="2400" dirty="0">
-                <a:solidFill>
-                  <a:schemeClr val="bg1"/>
-                </a:solidFill>
-              </a:endParaRPr>
             </a:p>
           </p:txBody>
         </p:sp>
@@ -10302,7 +10104,6 @@
               <a:rPr lang="en-US" dirty="0" smtClean="0"/>
               <a:t>after all works done!</a:t>
             </a:r>
-            <a:endParaRPr lang="en-US" dirty="0" smtClean="0"/>
           </a:p>
           <a:p>
             <a:endParaRPr lang="en-US" dirty="0"/>
@@ -10613,19 +10414,11 @@
             </a:pPr>
             <a:r>
               <a:rPr lang="en-US" dirty="0" smtClean="0"/>
-              <a:t>Let’s give a time interval </a:t>
-            </a:r>
-            <a:r>
-              <a:rPr lang="en-US" dirty="0" smtClean="0"/>
-              <a:t>for avoiding </a:t>
+              <a:t>Let’s give a time interval for avoiding </a:t>
             </a:r>
             <a:r>
               <a:rPr lang="en-US" b="1" dirty="0" smtClean="0"/>
-              <a:t>security </a:t>
-            </a:r>
-            <a:r>
-              <a:rPr lang="en-US" b="1" dirty="0" smtClean="0"/>
-              <a:t>blocking</a:t>
+              <a:t>security blocking</a:t>
             </a:r>
             <a:r>
               <a:rPr lang="en-US" dirty="0" smtClean="0"/>
@@ -10646,7 +10439,6 @@
               <a:rPr lang="en-US" dirty="0" smtClean="0"/>
               <a:t>Let’s see the differences…</a:t>
             </a:r>
-            <a:endParaRPr lang="en-US" dirty="0" smtClean="0"/>
           </a:p>
         </p:txBody>
       </p:sp>
@@ -11104,11 +10896,6 @@
                 </a:rPr>
                 <a:t>Challenging Simulation</a:t>
               </a:r>
-              <a:endParaRPr lang="en-US" sz="2400" dirty="0">
-                <a:solidFill>
-                  <a:schemeClr val="bg1"/>
-                </a:solidFill>
-              </a:endParaRPr>
             </a:p>
           </p:txBody>
         </p:sp>
@@ -11316,7 +11103,6 @@
               <a:rPr lang="en-US" sz="4400" b="1" dirty="0" smtClean="0"/>
               <a:t>5 lines!</a:t>
             </a:r>
-            <a:endParaRPr lang="en-US" sz="4400" b="1" dirty="0" smtClean="0"/>
           </a:p>
           <a:p>
             <a:pPr marL="768096" lvl="2" indent="0">
@@ -11347,23 +11133,7 @@
                   <a:srgbClr val="FF0000"/>
                 </a:solidFill>
               </a:rPr>
-              <a:t>Account myUsers []= AccountBuilder.create("one@gmail.com", </a:t>
-            </a:r>
-            <a:r>
-              <a:rPr lang="en-US" sz="1600" i="1" noProof="1" smtClean="0">
-                <a:solidFill>
-                  <a:srgbClr val="FF0000"/>
-                </a:solidFill>
-              </a:rPr>
-              <a:t>“key", “horray socnetSDK</a:t>
-            </a:r>
-            <a:r>
-              <a:rPr lang="en-US" sz="1600" i="1" noProof="1" smtClean="0">
-                <a:solidFill>
-                  <a:srgbClr val="FF0000"/>
-                </a:solidFill>
-              </a:rPr>
-              <a:t>!”, SocialMedia.FACEBOOK, SocialMedia.TWITTER);</a:t>
+              <a:t>Account myUsers []= AccountBuilder.create("one@gmail.com", “key", “horray socnetSDK!”, SocialMedia.FACEBOOK, SocialMedia.TWITTER);</a:t>
             </a:r>
           </a:p>
           <a:p>
@@ -11469,7 +11239,6 @@
               <a:rPr lang="en-US" sz="4400" b="1" dirty="0" smtClean="0"/>
               <a:t>5 lines!</a:t>
             </a:r>
-            <a:endParaRPr lang="en-US" sz="4400" b="1" dirty="0" smtClean="0"/>
           </a:p>
           <a:p>
             <a:pPr marL="768096" lvl="2" indent="0">
@@ -11500,15 +11269,7 @@
                   <a:srgbClr val="FF0000"/>
                 </a:solidFill>
               </a:rPr>
-              <a:t>Account myUsers []= AccountBuilder.create("one@gmail.com", “key", “horray socnetSDK!”, SocialMedia.FACEBOOK</a:t>
-            </a:r>
-            <a:r>
-              <a:rPr lang="en-US" sz="1600" i="1" noProof="1">
-                <a:solidFill>
-                  <a:srgbClr val="FF0000"/>
-                </a:solidFill>
-              </a:rPr>
-              <a:t>, SocialMedia.TWITTER);</a:t>
+              <a:t>Account myUsers []= AccountBuilder.create("one@gmail.com", “key", “horray socnetSDK!”, SocialMedia.FACEBOOK, SocialMedia.TWITTER);</a:t>
             </a:r>
             <a:endParaRPr lang="en-US" sz="1600" i="1" noProof="1" smtClean="0">
               <a:solidFill>
@@ -11689,11 +11450,6 @@
                 </a:rPr>
                 <a:t>Challenging Simulation</a:t>
               </a:r>
-              <a:endParaRPr lang="en-US" sz="2400" dirty="0">
-                <a:solidFill>
-                  <a:schemeClr val="bg1"/>
-                </a:solidFill>
-              </a:endParaRPr>
             </a:p>
           </p:txBody>
         </p:sp>
@@ -11885,15 +11641,7 @@
                   <a:srgbClr val="FF0000"/>
                 </a:solidFill>
               </a:rPr>
-              <a:t>interval </a:t>
-            </a:r>
-            <a:r>
-              <a:rPr lang="en-US" b="1" dirty="0" smtClean="0">
-                <a:solidFill>
-                  <a:srgbClr val="FF0000"/>
-                </a:solidFill>
-              </a:rPr>
-              <a:t>number</a:t>
+              <a:t>interval number</a:t>
             </a:r>
             <a:r>
               <a:rPr lang="en-US" b="1" dirty="0" smtClean="0"/>
@@ -11901,11 +11649,7 @@
             </a:r>
             <a:r>
               <a:rPr lang="en-US" dirty="0" smtClean="0"/>
-              <a:t> </a:t>
-            </a:r>
-            <a:r>
-              <a:rPr lang="en-US" dirty="0" smtClean="0"/>
-              <a:t>for </a:t>
+              <a:t> for </a:t>
             </a:r>
             <a:r>
               <a:rPr lang="en-US" b="1" dirty="0" smtClean="0"/>
@@ -12581,15 +12325,7 @@
                   <a:schemeClr val="tx1"/>
                 </a:solidFill>
               </a:rPr>
-              <a:t>2 </a:t>
-            </a:r>
-            <a:r>
-              <a:rPr lang="en-US" sz="9600" b="1" dirty="0" smtClean="0">
-                <a:solidFill>
-                  <a:schemeClr val="tx1"/>
-                </a:solidFill>
-              </a:rPr>
-              <a:t>TYPES OF SOCNET SDK USERS</a:t>
+              <a:t>2 TYPES OF SOCNET SDK USERS</a:t>
             </a:r>
             <a:endParaRPr lang="en-US" sz="9600" b="1" dirty="0">
               <a:solidFill>
@@ -12693,11 +12429,7 @@
             </a:r>
             <a:r>
               <a:rPr lang="en-US" sz="2800" dirty="0" smtClean="0"/>
-              <a:t> </a:t>
-            </a:r>
-            <a:r>
-              <a:rPr lang="en-US" sz="2800" dirty="0" smtClean="0"/>
-              <a:t>is used by 2 users:</a:t>
+              <a:t> is used by 2 users:</a:t>
             </a:r>
             <a:endParaRPr lang="en-US" sz="2800" dirty="0"/>
           </a:p>
@@ -12718,19 +12450,7 @@
             </a:pPr>
             <a:r>
               <a:rPr lang="en-US" sz="2400" b="1" dirty="0" smtClean="0"/>
-              <a:t>Called by Parameter </a:t>
-            </a:r>
-            <a:r>
-              <a:rPr lang="en-US" sz="2400" b="1" dirty="0" smtClean="0"/>
-              <a:t>Call </a:t>
-            </a:r>
-            <a:r>
-              <a:rPr lang="en-US" sz="2400" b="1" dirty="0" smtClean="0"/>
-              <a:t>within Command </a:t>
-            </a:r>
-            <a:r>
-              <a:rPr lang="en-US" sz="2400" b="1" dirty="0" smtClean="0"/>
-              <a:t>Prompt</a:t>
+              <a:t>Called by Parameter Call within Command Prompt</a:t>
             </a:r>
           </a:p>
           <a:p>
@@ -12741,7 +12461,6 @@
               <a:rPr lang="en-US" sz="2400" b="1" dirty="0" smtClean="0"/>
               <a:t>(these slides)</a:t>
             </a:r>
-            <a:endParaRPr lang="en-US" sz="2400" b="1" dirty="0" smtClean="0"/>
           </a:p>
           <a:p>
             <a:pPr marL="925830" lvl="1" indent="-514350">
@@ -12767,17 +12486,8 @@
             </a:pPr>
             <a:r>
               <a:rPr lang="en-US" sz="2400" dirty="0" smtClean="0"/>
-              <a:t>Called within Java </a:t>
-            </a:r>
-            <a:r>
-              <a:rPr lang="en-US" sz="2400" dirty="0" smtClean="0"/>
-              <a:t>Code </a:t>
-            </a:r>
-            <a:r>
-              <a:rPr lang="en-US" sz="2400" dirty="0" smtClean="0"/>
-              <a:t>as Library</a:t>
-            </a:r>
-            <a:endParaRPr lang="en-US" sz="2400" dirty="0" smtClean="0"/>
+              <a:t>Called within Java Code as Library</a:t>
+            </a:r>
           </a:p>
           <a:p>
             <a:pPr marL="411480" lvl="1" indent="0">
@@ -13171,7 +12881,23 @@
                   <a:schemeClr val="tx1"/>
                 </a:solidFill>
               </a:rPr>
-              <a:t>HOW DOES SOCNET SDK WORKS?</a:t>
+              <a:t>HOW DOES SOCNET </a:t>
+            </a:r>
+            <a:r>
+              <a:rPr lang="en-US" sz="9600" b="1" smtClean="0">
+                <a:solidFill>
+                  <a:schemeClr val="tx1"/>
+                </a:solidFill>
+              </a:rPr>
+              <a:t>SDK </a:t>
+            </a:r>
+            <a:r>
+              <a:rPr lang="en-US" sz="9600" b="1" smtClean="0">
+                <a:solidFill>
+                  <a:schemeClr val="tx1"/>
+                </a:solidFill>
+              </a:rPr>
+              <a:t>WORK?</a:t>
             </a:r>
             <a:endParaRPr lang="en-US" sz="9600" b="1" dirty="0">
               <a:solidFill>
@@ -13275,13 +13001,8 @@
             </a:r>
             <a:r>
               <a:rPr lang="en-US" sz="2800" dirty="0" smtClean="0"/>
-              <a:t> </a:t>
-            </a:r>
-            <a:r>
-              <a:rPr lang="en-US" sz="2800" dirty="0" smtClean="0"/>
-              <a:t>will start by executing several main files such as :</a:t>
-            </a:r>
-            <a:endParaRPr lang="en-US" sz="2800" dirty="0" smtClean="0"/>
+              <a:t> will start by executing several main files such as :</a:t>
+            </a:r>
           </a:p>
           <a:p>
             <a:pPr lvl="1"/>
@@ -13297,7 +13018,6 @@
               <a:rPr lang="en-US" sz="2400" dirty="0" smtClean="0"/>
               <a:t>main engine.</a:t>
             </a:r>
-            <a:endParaRPr lang="en-US" sz="2400" dirty="0" smtClean="0"/>
           </a:p>
           <a:p>
             <a:pPr lvl="1"/>
@@ -13870,11 +13590,6 @@
                 </a:rPr>
                 <a:t> SDK work?</a:t>
               </a:r>
-              <a:endParaRPr lang="en-US" sz="2400" dirty="0">
-                <a:solidFill>
-                  <a:schemeClr val="bg1"/>
-                </a:solidFill>
-              </a:endParaRPr>
             </a:p>
           </p:txBody>
         </p:sp>
@@ -14860,11 +14575,7 @@
           <a:p>
             <a:r>
               <a:rPr lang="en-US" b="1" dirty="0" smtClean="0"/>
-              <a:t>‘</a:t>
-            </a:r>
-            <a:r>
-              <a:rPr lang="en-US" b="1" dirty="0" smtClean="0"/>
-              <a:t>bot’</a:t>
+              <a:t>‘bot’</a:t>
             </a:r>
             <a:r>
               <a:rPr lang="en-US" dirty="0" smtClean="0"/>
@@ -14878,7 +14589,6 @@
               <a:rPr lang="en-US" dirty="0" smtClean="0"/>
               <a:t>entering something).</a:t>
             </a:r>
-            <a:endParaRPr lang="en-US" dirty="0" smtClean="0"/>
           </a:p>
           <a:p>
             <a:r>
@@ -14891,11 +14601,7 @@
             </a:r>
             <a:r>
               <a:rPr lang="en-US" dirty="0" smtClean="0"/>
-              <a:t> </a:t>
-            </a:r>
-            <a:r>
-              <a:rPr lang="en-US" dirty="0" smtClean="0"/>
-              <a:t>implements </a:t>
+              <a:t> implements </a:t>
             </a:r>
             <a:r>
               <a:rPr lang="en-US" b="1" dirty="0" err="1" smtClean="0"/>
@@ -14911,19 +14617,11 @@
             </a:r>
             <a:r>
               <a:rPr lang="en-US" b="1" dirty="0" smtClean="0"/>
-              <a:t>Chrome </a:t>
-            </a:r>
-            <a:r>
-              <a:rPr lang="en-US" b="1" dirty="0" smtClean="0"/>
-              <a:t>Engine</a:t>
+              <a:t>Chrome Engine</a:t>
             </a:r>
             <a:r>
               <a:rPr lang="en-US" dirty="0" smtClean="0"/>
-              <a:t> </a:t>
-            </a:r>
-            <a:r>
-              <a:rPr lang="en-US" dirty="0" smtClean="0"/>
-              <a:t>that will be executed as </a:t>
+              <a:t> that will be executed as </a:t>
             </a:r>
             <a:r>
               <a:rPr lang="en-US" b="1" dirty="0" smtClean="0"/>
@@ -15086,11 +14784,6 @@
                 </a:rPr>
                 <a:t> SDK work?</a:t>
               </a:r>
-              <a:endParaRPr lang="en-US" sz="2400" dirty="0">
-                <a:solidFill>
-                  <a:schemeClr val="bg1"/>
-                </a:solidFill>
-              </a:endParaRPr>
             </a:p>
           </p:txBody>
         </p:sp>
@@ -15301,39 +14994,26 @@
               <a:rPr lang="en-US" dirty="0" smtClean="0"/>
               <a:t> such as: </a:t>
             </a:r>
-            <a:endParaRPr lang="en-US" dirty="0" smtClean="0"/>
           </a:p>
           <a:p>
             <a:pPr lvl="1"/>
             <a:r>
               <a:rPr lang="en-US" dirty="0" smtClean="0"/>
-              <a:t>clicking </a:t>
-            </a:r>
+              <a:t>clicking button, </a:t>
+            </a:r>
+          </a:p>
+          <a:p>
+            <a:pPr lvl="1"/>
             <a:r>
               <a:rPr lang="en-US" dirty="0" smtClean="0"/>
-              <a:t>button, </a:t>
+              <a:t>Typing text, </a:t>
             </a:r>
           </a:p>
           <a:p>
             <a:pPr lvl="1"/>
             <a:r>
               <a:rPr lang="en-US" dirty="0" smtClean="0"/>
-              <a:t>Typing </a:t>
-            </a:r>
-            <a:r>
-              <a:rPr lang="en-US" dirty="0" smtClean="0"/>
-              <a:t>text, </a:t>
-            </a:r>
-          </a:p>
-          <a:p>
-            <a:pPr lvl="1"/>
-            <a:r>
-              <a:rPr lang="en-US" dirty="0" smtClean="0"/>
-              <a:t>Pressing enter</a:t>
-            </a:r>
-            <a:r>
-              <a:rPr lang="en-US" dirty="0" smtClean="0"/>
-              <a:t>, </a:t>
+              <a:t>Pressing enter, </a:t>
             </a:r>
           </a:p>
           <a:p>
@@ -15502,11 +15182,6 @@
                 </a:rPr>
                 <a:t> SDK work?</a:t>
               </a:r>
-              <a:endParaRPr lang="en-US" sz="2400" dirty="0">
-                <a:solidFill>
-                  <a:schemeClr val="bg1"/>
-                </a:solidFill>
-              </a:endParaRPr>
             </a:p>
           </p:txBody>
         </p:sp>

</xml_diff>